<commit_message>
fixed weird formatting issue
</commit_message>
<xml_diff>
--- a/docs/slides/06/06_hash_maps.pptx
+++ b/docs/slides/06/06_hash_maps.pptx
@@ -2172,7 +2172,7 @@
           </a:ln>
           <a:extLst>
             <a:ext uri="{C572A759-6A51-4108-AA02-DFA0A04FC94B}">
-              <ma14:wrappingTextBoxFlag xmlns="" xmlns:ma14="http://schemas.microsoft.com/office/mac/drawingml/2011/main" val="1"/>
+              <ma14:wrappingTextBoxFlag xmlns:ma14="http://schemas.microsoft.com/office/mac/drawingml/2011/main" xmlns="" val="1"/>
             </a:ext>
           </a:extLst>
         </p:spPr>
@@ -2211,7 +2211,7 @@
           </a:ln>
           <a:extLst>
             <a:ext uri="{C572A759-6A51-4108-AA02-DFA0A04FC94B}">
-              <ma14:wrappingTextBoxFlag xmlns="" xmlns:ma14="http://schemas.microsoft.com/office/mac/drawingml/2011/main" val="1"/>
+              <ma14:wrappingTextBoxFlag xmlns:ma14="http://schemas.microsoft.com/office/mac/drawingml/2011/main" xmlns="" val="1"/>
             </a:ext>
           </a:extLst>
         </p:spPr>
@@ -3143,31 +3143,26 @@
           <a:p>
             <a:pPr algn="l"/>
             <a:r>
-              <a:rPr lang="en-US" sz="6600" dirty="0" smtClean="0"/>
+              <a:rPr lang="en-US" sz="6600" dirty="0"/>
               <a:t>PG4200: Algorithms And Data Structures</a:t>
             </a:r>
             <a:br>
-              <a:rPr lang="en-US" sz="6600" dirty="0" smtClean="0"/>
+              <a:rPr lang="en-US" sz="6600" dirty="0"/>
             </a:br>
-            <a:r>
-              <a:rPr lang="en-US" sz="6600" dirty="0" smtClean="0"/>
-              <a:t/>
-            </a:r>
             <a:br>
-              <a:rPr lang="en-US" sz="6600" dirty="0" smtClean="0"/>
+              <a:rPr lang="en-US" sz="6600" dirty="0"/>
             </a:br>
             <a:r>
-              <a:rPr lang="en-US" sz="6600" dirty="0" smtClean="0"/>
+              <a:rPr lang="en-US" sz="6600" dirty="0"/>
               <a:t>Lesson 06: </a:t>
             </a:r>
             <a:br>
-              <a:rPr lang="en-US" sz="6600" dirty="0" smtClean="0"/>
+              <a:rPr lang="en-US" sz="6600" dirty="0"/>
             </a:br>
             <a:r>
-              <a:rPr lang="en-US" sz="6600" dirty="0" smtClean="0"/>
+              <a:rPr lang="en-US" sz="6600" dirty="0"/>
               <a:t>Hash Maps and Sets</a:t>
             </a:r>
-            <a:endParaRPr lang="en-US" sz="6600" dirty="0"/>
           </a:p>
         </p:txBody>
       </p:sp>
@@ -3193,14 +3188,13 @@
           <a:p>
             <a:pPr algn="r"/>
             <a:r>
-              <a:rPr lang="en-US" smtClean="0"/>
+              <a:rPr lang="en-US"/>
               <a:t>Prof. </a:t>
             </a:r>
             <a:r>
-              <a:rPr lang="en-US" dirty="0" smtClean="0"/>
+              <a:rPr lang="en-US" dirty="0"/>
               <a:t>Andrea Arcuri</a:t>
             </a:r>
-            <a:endParaRPr lang="en-US" dirty="0"/>
           </a:p>
         </p:txBody>
       </p:sp>
@@ -3215,13 +3209,6 @@
     <a:masterClrMapping/>
   </p:clrMapOvr>
   <p:transition spd="med"/>
-  <p:timing>
-    <p:tnLst>
-      <p:par>
-        <p:cTn id="1" dur="indefinite" restart="never" nodeType="tmRoot"/>
-      </p:par>
-    </p:tnLst>
-  </p:timing>
 </p:sld>
 </file>
 
@@ -3258,7 +3245,7 @@
           <a:lstStyle/>
           <a:p>
             <a:r>
-              <a:rPr lang="en-US" dirty="0" err="1" smtClean="0"/>
+              <a:rPr lang="en-US" dirty="0" err="1"/>
               <a:t>java.lang.Object</a:t>
             </a:r>
             <a:endParaRPr lang="en-US" dirty="0"/>
@@ -3288,98 +3275,67 @@
           <a:lstStyle/>
           <a:p>
             <a:r>
-              <a:rPr lang="en-US" i="1" dirty="0" smtClean="0"/>
+              <a:rPr lang="en-US" i="1" dirty="0"/>
               <a:t>Object</a:t>
             </a:r>
             <a:r>
-              <a:rPr lang="en-US" dirty="0" smtClean="0"/>
+              <a:rPr lang="en-US" dirty="0"/>
               <a:t> does define two methods: </a:t>
             </a:r>
             <a:r>
-              <a:rPr lang="en-US" i="1" dirty="0" err="1" smtClean="0"/>
+              <a:rPr lang="en-US" i="1" dirty="0" err="1"/>
               <a:t>hashCode</a:t>
             </a:r>
             <a:r>
-              <a:rPr lang="en-US" i="1" dirty="0" smtClean="0"/>
+              <a:rPr lang="en-US" i="1" dirty="0"/>
               <a:t>() </a:t>
             </a:r>
             <a:r>
-              <a:rPr lang="en-US" dirty="0" smtClean="0"/>
+              <a:rPr lang="en-US" dirty="0"/>
               <a:t>and </a:t>
             </a:r>
             <a:r>
-              <a:rPr lang="en-US" i="1" dirty="0" smtClean="0"/>
+              <a:rPr lang="en-US" i="1" dirty="0"/>
               <a:t>equals()</a:t>
             </a:r>
           </a:p>
           <a:p>
             <a:r>
-              <a:rPr lang="en-US" dirty="0" smtClean="0"/>
+              <a:rPr lang="en-US" dirty="0"/>
               <a:t>Those methods will depend on the internal fields of the object</a:t>
             </a:r>
           </a:p>
           <a:p>
             <a:r>
-              <a:rPr lang="en-US" i="1" dirty="0" smtClean="0"/>
+              <a:rPr lang="en-US" i="1" dirty="0"/>
               <a:t>Important</a:t>
             </a:r>
             <a:r>
-              <a:rPr lang="en-US" dirty="0" smtClean="0"/>
+              <a:rPr lang="en-US" dirty="0"/>
               <a:t>: if two objects are equals, then they </a:t>
             </a:r>
             <a:r>
-              <a:rPr lang="en-US" b="1" dirty="0" smtClean="0"/>
+              <a:rPr lang="en-US" b="1" dirty="0"/>
               <a:t>MUST</a:t>
             </a:r>
             <a:r>
-              <a:rPr lang="en-US" dirty="0" smtClean="0"/>
+              <a:rPr lang="en-US" dirty="0"/>
               <a:t> have same hash code </a:t>
             </a:r>
           </a:p>
           <a:p>
             <a:pPr lvl="1"/>
             <a:r>
-              <a:rPr lang="en-US" i="1" dirty="0" err="1" smtClean="0"/>
+              <a:rPr lang="en-US" i="1" dirty="0" err="1"/>
               <a:t>A.equals</a:t>
             </a:r>
             <a:r>
-              <a:rPr lang="en-US" i="1" dirty="0" smtClean="0"/>
+              <a:rPr lang="en-US" i="1" dirty="0"/>
               <a:t>(B)</a:t>
             </a:r>
             <a:r>
-              <a:rPr lang="en-US" dirty="0" smtClean="0"/>
+              <a:rPr lang="en-US" dirty="0"/>
               <a:t> implies </a:t>
-            </a:r>
-            <a:r>
-              <a:rPr lang="en-US" i="1" dirty="0" err="1" smtClean="0"/>
-              <a:t>A.hashCode</a:t>
-            </a:r>
-            <a:r>
-              <a:rPr lang="en-US" i="1" dirty="0" smtClean="0"/>
-              <a:t>()==</a:t>
-            </a:r>
-            <a:r>
-              <a:rPr lang="en-US" i="1" dirty="0" err="1" smtClean="0"/>
-              <a:t>B.hashCode</a:t>
-            </a:r>
-            <a:r>
-              <a:rPr lang="en-US" i="1" dirty="0" smtClean="0"/>
-              <a:t>()</a:t>
-            </a:r>
-          </a:p>
-          <a:p>
-            <a:pPr lvl="1"/>
-            <a:r>
-              <a:rPr lang="en-US" dirty="0" smtClean="0"/>
-              <a:t>The vice-versa is not necessarily true, </a:t>
-            </a:r>
-            <a:r>
-              <a:rPr lang="en-US" dirty="0" err="1" smtClean="0"/>
-              <a:t>ie</a:t>
-            </a:r>
-            <a:r>
-              <a:rPr lang="en-US" dirty="0" smtClean="0"/>
-              <a:t> </a:t>
             </a:r>
             <a:r>
               <a:rPr lang="en-US" i="1" dirty="0" err="1"/>
@@ -3394,11 +3350,42 @@
               <a:t>B.hashCode</a:t>
             </a:r>
             <a:r>
-              <a:rPr lang="en-US" i="1" dirty="0" smtClean="0"/>
+              <a:rPr lang="en-US" i="1" dirty="0"/>
               <a:t>()</a:t>
             </a:r>
-            <a:r>
-              <a:rPr lang="en-US" dirty="0" smtClean="0"/>
+          </a:p>
+          <a:p>
+            <a:pPr lvl="1"/>
+            <a:r>
+              <a:rPr lang="en-US" dirty="0"/>
+              <a:t>The vice-versa is not necessarily true, </a:t>
+            </a:r>
+            <a:r>
+              <a:rPr lang="en-US" dirty="0" err="1"/>
+              <a:t>ie</a:t>
+            </a:r>
+            <a:r>
+              <a:rPr lang="en-US" dirty="0"/>
+              <a:t> </a:t>
+            </a:r>
+            <a:r>
+              <a:rPr lang="en-US" i="1" dirty="0" err="1"/>
+              <a:t>A.hashCode</a:t>
+            </a:r>
+            <a:r>
+              <a:rPr lang="en-US" i="1" dirty="0"/>
+              <a:t>()==</a:t>
+            </a:r>
+            <a:r>
+              <a:rPr lang="en-US" i="1" dirty="0" err="1"/>
+              <a:t>B.hashCode</a:t>
+            </a:r>
+            <a:r>
+              <a:rPr lang="en-US" i="1" dirty="0"/>
+              <a:t>()</a:t>
+            </a:r>
+            <a:r>
+              <a:rPr lang="en-US" dirty="0"/>
               <a:t> does not imply </a:t>
             </a:r>
             <a:r>
@@ -3407,20 +3394,16 @@
             </a:r>
             <a:r>
               <a:rPr lang="en-US" i="1" dirty="0"/>
-              <a:t>(B</a:t>
-            </a:r>
-            <a:r>
-              <a:rPr lang="en-US" i="1" dirty="0" smtClean="0"/>
-              <a:t>)</a:t>
-            </a:r>
-            <a:r>
-              <a:rPr lang="en-US" dirty="0" smtClean="0"/>
+              <a:t>(B)</a:t>
+            </a:r>
+            <a:r>
+              <a:rPr lang="en-US" dirty="0"/>
               <a:t>, although that could happen</a:t>
             </a:r>
           </a:p>
           <a:p>
             <a:r>
-              <a:rPr lang="en-US" dirty="0" smtClean="0"/>
+              <a:rPr lang="en-US" dirty="0"/>
               <a:t>What if constraint is not satisfied? Expect weird bugs when using maps and sets… </a:t>
             </a:r>
           </a:p>
@@ -3473,10 +3456,9 @@
           <a:lstStyle/>
           <a:p>
             <a:r>
-              <a:rPr lang="en-US" dirty="0" smtClean="0"/>
+              <a:rPr lang="en-US" dirty="0"/>
               <a:t>Cost</a:t>
             </a:r>
-            <a:endParaRPr lang="en-US" dirty="0"/>
           </a:p>
         </p:txBody>
       </p:sp>
@@ -3496,31 +3478,31 @@
           <a:lstStyle/>
           <a:p>
             <a:r>
-              <a:rPr lang="en-US" dirty="0" smtClean="0"/>
+              <a:rPr lang="en-US" dirty="0"/>
               <a:t>Worst case: </a:t>
             </a:r>
             <a:r>
-              <a:rPr lang="en-US" b="1" dirty="0" smtClean="0"/>
+              <a:rPr lang="en-US" b="1" dirty="0"/>
               <a:t>O(N)</a:t>
             </a:r>
             <a:r>
-              <a:rPr lang="en-US" dirty="0" smtClean="0"/>
+              <a:rPr lang="en-US" dirty="0"/>
               <a:t> if all elements end up in same “bucket” (</a:t>
             </a:r>
             <a:r>
-              <a:rPr lang="en-US" dirty="0" err="1" smtClean="0"/>
+              <a:rPr lang="en-US" dirty="0" err="1"/>
               <a:t>ie</a:t>
             </a:r>
             <a:r>
-              <a:rPr lang="en-US" dirty="0" smtClean="0"/>
+              <a:rPr lang="en-US" dirty="0"/>
               <a:t> same value for </a:t>
             </a:r>
             <a:r>
-              <a:rPr lang="en-US" i="1" dirty="0" smtClean="0"/>
+              <a:rPr lang="en-US" i="1" dirty="0"/>
               <a:t>h()%M</a:t>
             </a:r>
             <a:r>
-              <a:rPr lang="en-US" dirty="0" smtClean="0"/>
+              <a:rPr lang="en-US" dirty="0"/>
               <a:t>), the map would be equivalent to a list</a:t>
             </a:r>
           </a:p>
@@ -3528,32 +3510,28 @@
             <a:pPr lvl="1"/>
             <a:r>
               <a:rPr lang="en-US" dirty="0"/>
-              <a:t>o</a:t>
-            </a:r>
-            <a:r>
-              <a:rPr lang="en-US" dirty="0" smtClean="0"/>
-              <a:t>perations to search on list would be O(N), albeit insert would be O(1) </a:t>
-            </a:r>
-          </a:p>
-          <a:p>
-            <a:r>
-              <a:rPr lang="en-US" dirty="0" smtClean="0"/>
+              <a:t>operations to search on list would be O(N), albeit insert would be O(1) </a:t>
+            </a:r>
+          </a:p>
+          <a:p>
+            <a:r>
+              <a:rPr lang="en-US" dirty="0"/>
               <a:t>But, </a:t>
             </a:r>
             <a:r>
-              <a:rPr lang="en-US" b="1" dirty="0" smtClean="0"/>
+              <a:rPr lang="en-US" b="1" dirty="0"/>
               <a:t>if</a:t>
             </a:r>
             <a:r>
-              <a:rPr lang="en-US" dirty="0" smtClean="0"/>
+              <a:rPr lang="en-US" dirty="0"/>
               <a:t> M large enough compared to N, and hash function is uniform enough, you can have a </a:t>
             </a:r>
             <a:r>
-              <a:rPr lang="en-US" b="1" dirty="0" smtClean="0"/>
+              <a:rPr lang="en-US" b="1" dirty="0"/>
               <a:t>O(1) </a:t>
             </a:r>
             <a:r>
-              <a:rPr lang="en-US" dirty="0" smtClean="0"/>
+              <a:rPr lang="en-US" dirty="0"/>
               <a:t>cost in many cases</a:t>
             </a:r>
           </a:p>
@@ -3561,13 +3539,8 @@
             <a:pPr lvl="1"/>
             <a:r>
               <a:rPr lang="en-US" dirty="0"/>
-              <a:t>e</a:t>
-            </a:r>
-            <a:r>
-              <a:rPr lang="en-US" dirty="0" smtClean="0"/>
-              <a:t>ven if you have some collisions, it will not be a problem, as you would have a small number of elements in the list </a:t>
-            </a:r>
-            <a:endParaRPr lang="en-US" dirty="0"/>
+              <a:t>even if you have some collisions, it will not be a problem, as you would have a small number of elements in the list </a:t>
+            </a:r>
           </a:p>
         </p:txBody>
       </p:sp>
@@ -3618,10 +3591,9 @@
           <a:lstStyle/>
           <a:p>
             <a:r>
-              <a:rPr lang="en-US" dirty="0" smtClean="0"/>
+              <a:rPr lang="en-US" dirty="0"/>
               <a:t>Hash or RBT?</a:t>
             </a:r>
-            <a:endParaRPr lang="en-US" dirty="0"/>
           </a:p>
         </p:txBody>
       </p:sp>
@@ -3648,93 +3620,92 @@
           <a:lstStyle/>
           <a:p>
             <a:r>
-              <a:rPr lang="en-US" dirty="0" smtClean="0"/>
+              <a:rPr lang="en-US" dirty="0"/>
               <a:t>Hash Maps is the most popular and widely used</a:t>
             </a:r>
           </a:p>
           <a:p>
             <a:r>
-              <a:rPr lang="en-US" dirty="0" smtClean="0"/>
+              <a:rPr lang="en-US" dirty="0"/>
               <a:t>If you know how much data you </a:t>
             </a:r>
             <a:r>
-              <a:rPr lang="en-US" dirty="0" err="1" smtClean="0"/>
+              <a:rPr lang="en-US" dirty="0" err="1"/>
               <a:t>ll</a:t>
             </a:r>
             <a:r>
-              <a:rPr lang="en-US" dirty="0" smtClean="0"/>
+              <a:rPr lang="en-US" dirty="0"/>
               <a:t> insert at most, can choose a good large enough M</a:t>
             </a:r>
           </a:p>
           <a:p>
             <a:r>
-              <a:rPr lang="en-US" dirty="0" smtClean="0"/>
+              <a:rPr lang="en-US" dirty="0"/>
               <a:t>So in most cases, we are in </a:t>
             </a:r>
             <a:r>
-              <a:rPr lang="en-US" i="1" dirty="0" smtClean="0"/>
+              <a:rPr lang="en-US" i="1" dirty="0"/>
               <a:t>O(1)</a:t>
             </a:r>
             <a:r>
-              <a:rPr lang="en-US" dirty="0" smtClean="0"/>
+              <a:rPr lang="en-US" dirty="0"/>
               <a:t> Hash vs </a:t>
             </a:r>
             <a:r>
-              <a:rPr lang="en-US" i="1" dirty="0" smtClean="0"/>
+              <a:rPr lang="en-US" i="1" dirty="0"/>
               <a:t>O(log N)</a:t>
             </a:r>
             <a:r>
-              <a:rPr lang="en-US" dirty="0" smtClean="0"/>
+              <a:rPr lang="en-US" dirty="0"/>
               <a:t> RBT</a:t>
             </a:r>
           </a:p>
           <a:p>
             <a:r>
-              <a:rPr lang="en-US" dirty="0" smtClean="0"/>
+              <a:rPr lang="en-US" dirty="0"/>
               <a:t>But Hash can be </a:t>
             </a:r>
             <a:r>
-              <a:rPr lang="en-US" i="1" dirty="0" smtClean="0"/>
+              <a:rPr lang="en-US" i="1" dirty="0"/>
               <a:t>O(N)</a:t>
             </a:r>
             <a:r>
-              <a:rPr lang="en-US" dirty="0" smtClean="0"/>
+              <a:rPr lang="en-US" dirty="0"/>
               <a:t> in worst case, vs RBT </a:t>
             </a:r>
             <a:r>
-              <a:rPr lang="en-US" b="1" dirty="0" smtClean="0"/>
+              <a:rPr lang="en-US" b="1" dirty="0"/>
               <a:t>guarantees</a:t>
             </a:r>
             <a:r>
-              <a:rPr lang="en-US" dirty="0" smtClean="0"/>
+              <a:rPr lang="en-US" dirty="0"/>
               <a:t> </a:t>
             </a:r>
             <a:r>
-              <a:rPr lang="en-US" i="1" dirty="0" smtClean="0"/>
+              <a:rPr lang="en-US" i="1" dirty="0"/>
               <a:t>O(log N)</a:t>
             </a:r>
             <a:r>
-              <a:rPr lang="en-US" dirty="0" smtClean="0"/>
+              <a:rPr lang="en-US" dirty="0"/>
               <a:t> in all cases</a:t>
             </a:r>
           </a:p>
           <a:p>
             <a:pPr lvl="1"/>
             <a:r>
-              <a:rPr lang="en-US" dirty="0" err="1" smtClean="0"/>
+              <a:rPr lang="en-US" dirty="0" err="1"/>
               <a:t>eg</a:t>
             </a:r>
             <a:r>
-              <a:rPr lang="en-US" dirty="0" smtClean="0"/>
+              <a:rPr lang="en-US" dirty="0"/>
               <a:t>, in critical systems where you MUST guarantee a response within a certain amount of time, might want to use RBT</a:t>
             </a:r>
           </a:p>
           <a:p>
             <a:r>
-              <a:rPr lang="en-US" dirty="0" smtClean="0"/>
+              <a:rPr lang="en-US" dirty="0"/>
               <a:t>Hash does not need ordering of keys</a:t>
             </a:r>
-            <a:endParaRPr lang="en-US" dirty="0"/>
           </a:p>
         </p:txBody>
       </p:sp>
@@ -3785,10 +3756,9 @@
           <a:lstStyle/>
           <a:p>
             <a:r>
-              <a:rPr lang="en-US" dirty="0" smtClean="0"/>
+              <a:rPr lang="en-US" dirty="0"/>
               <a:t>Set</a:t>
             </a:r>
-            <a:endParaRPr lang="en-US" dirty="0"/>
           </a:p>
         </p:txBody>
       </p:sp>
@@ -3813,104 +3783,95 @@
           <a:lstStyle/>
           <a:p>
             <a:r>
-              <a:rPr lang="en-US" dirty="0" smtClean="0"/>
+              <a:rPr lang="en-US" dirty="0"/>
               <a:t>In mathematics, a </a:t>
             </a:r>
             <a:r>
-              <a:rPr lang="en-US" i="1" dirty="0" smtClean="0"/>
+              <a:rPr lang="en-US" i="1" dirty="0"/>
               <a:t>set</a:t>
             </a:r>
             <a:r>
-              <a:rPr lang="en-US" dirty="0" smtClean="0"/>
+              <a:rPr lang="en-US" dirty="0"/>
               <a:t> is a collection of elements where:</a:t>
             </a:r>
           </a:p>
           <a:p>
             <a:pPr lvl="1"/>
             <a:r>
-              <a:rPr lang="en-US" dirty="0" smtClean="0"/>
+              <a:rPr lang="en-US" dirty="0"/>
               <a:t>1) </a:t>
             </a:r>
             <a:r>
-              <a:rPr lang="en-US" i="1" dirty="0" smtClean="0"/>
+              <a:rPr lang="en-US" i="1" dirty="0"/>
               <a:t>ordering is not important</a:t>
             </a:r>
             <a:r>
-              <a:rPr lang="en-US" dirty="0" smtClean="0"/>
+              <a:rPr lang="en-US" dirty="0"/>
               <a:t>: </a:t>
             </a:r>
             <a:r>
-              <a:rPr lang="en-US" dirty="0" err="1" smtClean="0"/>
+              <a:rPr lang="en-US" dirty="0" err="1"/>
               <a:t>ie</a:t>
             </a:r>
             <a:r>
-              <a:rPr lang="en-US" dirty="0" smtClean="0"/>
+              <a:rPr lang="en-US" dirty="0"/>
               <a:t> {1,2,3} is equivalent to {2,3,1}</a:t>
             </a:r>
           </a:p>
           <a:p>
             <a:pPr lvl="1"/>
             <a:r>
-              <a:rPr lang="en-US" dirty="0" smtClean="0"/>
+              <a:rPr lang="en-US" dirty="0"/>
               <a:t>2) </a:t>
             </a:r>
             <a:r>
-              <a:rPr lang="en-US" i="1" dirty="0" smtClean="0"/>
+              <a:rPr lang="en-US" i="1" dirty="0"/>
               <a:t>no repetitions</a:t>
             </a:r>
             <a:r>
-              <a:rPr lang="en-US" dirty="0" smtClean="0"/>
+              <a:rPr lang="en-US" dirty="0"/>
               <a:t>: </a:t>
             </a:r>
             <a:r>
-              <a:rPr lang="en-US" dirty="0" err="1" smtClean="0"/>
+              <a:rPr lang="en-US" dirty="0" err="1"/>
               <a:t>ie</a:t>
             </a:r>
             <a:r>
-              <a:rPr lang="en-US" dirty="0" smtClean="0"/>
+              <a:rPr lang="en-US" dirty="0"/>
               <a:t> {1,2} is the same as {2,1,1,2,2,1,1,2,1}</a:t>
             </a:r>
           </a:p>
           <a:p>
             <a:r>
-              <a:rPr lang="en-US" dirty="0" smtClean="0"/>
+              <a:rPr lang="en-US" dirty="0"/>
               <a:t>How to implement a Set in Java?</a:t>
             </a:r>
           </a:p>
           <a:p>
             <a:r>
-              <a:rPr lang="en-US" dirty="0" smtClean="0"/>
+              <a:rPr lang="en-US" dirty="0"/>
               <a:t>Easy: use an internal </a:t>
             </a:r>
             <a:r>
-              <a:rPr lang="en-US" i="1" dirty="0" smtClean="0"/>
+              <a:rPr lang="en-US" i="1" dirty="0"/>
               <a:t>Map&lt;K,V&gt;</a:t>
             </a:r>
             <a:r>
-              <a:rPr lang="en-US" dirty="0" smtClean="0"/>
-              <a:t> were your values in the set are the </a:t>
-            </a:r>
-            <a:r>
-              <a:rPr lang="en-US" dirty="0" smtClean="0"/>
-              <a:t>keys </a:t>
-            </a:r>
-            <a:r>
-              <a:rPr lang="en-US" i="1" dirty="0" smtClean="0"/>
+              <a:rPr lang="en-US" dirty="0"/>
+              <a:t> were your values in the set are the keys </a:t>
+            </a:r>
+            <a:r>
+              <a:rPr lang="en-US" i="1" dirty="0"/>
               <a:t>K</a:t>
             </a:r>
             <a:r>
-              <a:rPr lang="en-US" dirty="0" smtClean="0"/>
-              <a:t>, </a:t>
-            </a:r>
-            <a:r>
-              <a:rPr lang="en-US" dirty="0" smtClean="0"/>
-              <a:t>and you just ignore the values </a:t>
-            </a:r>
-            <a:r>
-              <a:rPr lang="en-US" i="1" dirty="0" smtClean="0"/>
+              <a:rPr lang="en-US" dirty="0"/>
+              <a:t>, and you just ignore the values </a:t>
+            </a:r>
+            <a:r>
+              <a:rPr lang="en-US" i="1" dirty="0"/>
               <a:t>V</a:t>
             </a:r>
-            <a:endParaRPr lang="en-US" i="1" dirty="0"/>
           </a:p>
         </p:txBody>
       </p:sp>
@@ -3961,10 +3922,9 @@
           <a:lstStyle/>
           <a:p>
             <a:r>
-              <a:rPr lang="en-US" dirty="0" smtClean="0"/>
+              <a:rPr lang="en-US" dirty="0"/>
               <a:t>Keys and Immutability</a:t>
             </a:r>
-            <a:endParaRPr lang="en-US" dirty="0"/>
           </a:p>
         </p:txBody>
       </p:sp>
@@ -3989,81 +3949,80 @@
           <a:lstStyle/>
           <a:p>
             <a:r>
-              <a:rPr lang="en-US" i="1" dirty="0" smtClean="0"/>
+              <a:rPr lang="en-US" i="1" dirty="0"/>
               <a:t>Immutable Object</a:t>
             </a:r>
             <a:r>
-              <a:rPr lang="en-US" dirty="0" smtClean="0"/>
+              <a:rPr lang="en-US" dirty="0"/>
               <a:t>: an object whose state cannot be changed once created</a:t>
             </a:r>
           </a:p>
           <a:p>
             <a:r>
-              <a:rPr lang="en-US" dirty="0" smtClean="0"/>
+              <a:rPr lang="en-US" dirty="0"/>
               <a:t>Example: Strings are immutable </a:t>
             </a:r>
           </a:p>
           <a:p>
             <a:pPr lvl="1"/>
             <a:r>
-              <a:rPr lang="en-US" dirty="0" err="1" smtClean="0"/>
+              <a:rPr lang="en-US" dirty="0" err="1"/>
               <a:t>eg</a:t>
             </a:r>
             <a:r>
-              <a:rPr lang="en-US" dirty="0" smtClean="0"/>
+              <a:rPr lang="en-US" dirty="0"/>
               <a:t>, concatenation with + and methods like </a:t>
             </a:r>
             <a:r>
-              <a:rPr lang="en-US" i="1" dirty="0" err="1" smtClean="0"/>
+              <a:rPr lang="en-US" i="1" dirty="0" err="1"/>
               <a:t>toUpperCase</a:t>
             </a:r>
             <a:r>
-              <a:rPr lang="en-US" i="1" dirty="0" smtClean="0"/>
+              <a:rPr lang="en-US" i="1" dirty="0"/>
               <a:t>()</a:t>
             </a:r>
             <a:r>
-              <a:rPr lang="en-US" dirty="0" smtClean="0"/>
+              <a:rPr lang="en-US" dirty="0"/>
               <a:t> and </a:t>
             </a:r>
             <a:r>
-              <a:rPr lang="en-US" i="1" dirty="0" smtClean="0"/>
+              <a:rPr lang="en-US" i="1" dirty="0"/>
               <a:t>substring()</a:t>
             </a:r>
             <a:r>
-              <a:rPr lang="en-US" dirty="0" smtClean="0"/>
+              <a:rPr lang="en-US" dirty="0"/>
               <a:t> do NOT change the String, but rather </a:t>
             </a:r>
             <a:r>
-              <a:rPr lang="en-US" i="1" dirty="0" smtClean="0"/>
+              <a:rPr lang="en-US" i="1" dirty="0"/>
               <a:t>create</a:t>
             </a:r>
             <a:r>
-              <a:rPr lang="en-US" dirty="0" smtClean="0"/>
+              <a:rPr lang="en-US" dirty="0"/>
               <a:t> a NEW one</a:t>
             </a:r>
           </a:p>
           <a:p>
             <a:r>
-              <a:rPr lang="en-US" dirty="0" smtClean="0"/>
+              <a:rPr lang="en-US" dirty="0"/>
               <a:t>Keys in a Map/Set </a:t>
             </a:r>
             <a:r>
-              <a:rPr lang="en-US" b="1" dirty="0" smtClean="0"/>
+              <a:rPr lang="en-US" b="1" dirty="0"/>
               <a:t>MUST</a:t>
             </a:r>
             <a:r>
-              <a:rPr lang="en-US" dirty="0" smtClean="0"/>
+              <a:rPr lang="en-US" dirty="0"/>
               <a:t> be </a:t>
             </a:r>
             <a:r>
-              <a:rPr lang="en-US" i="1" dirty="0" smtClean="0"/>
+              <a:rPr lang="en-US" i="1" dirty="0"/>
               <a:t>immutable</a:t>
             </a:r>
             <a:r>
-              <a:rPr lang="en-US" dirty="0" smtClean="0"/>
+              <a:rPr lang="en-US" dirty="0"/>
               <a:t>… why?</a:t>
             </a:r>
-            <a:endParaRPr lang="en-US" dirty="0"/>
           </a:p>
         </p:txBody>
       </p:sp>
@@ -4114,10 +4073,9 @@
           <a:lstStyle/>
           <a:p>
             <a:r>
-              <a:rPr lang="en-US" dirty="0" smtClean="0"/>
+              <a:rPr lang="en-US" dirty="0"/>
               <a:t>Different Hash</a:t>
             </a:r>
-            <a:endParaRPr lang="en-US" dirty="0"/>
           </a:p>
         </p:txBody>
       </p:sp>
@@ -4147,15 +4105,15 @@
               <a:buNone/>
             </a:pPr>
             <a:r>
-              <a:rPr lang="en-US" i="1" dirty="0" smtClean="0"/>
+              <a:rPr lang="en-US" i="1" dirty="0"/>
               <a:t>Foo </a:t>
             </a:r>
             <a:r>
-              <a:rPr lang="en-US" i="1" dirty="0" err="1" smtClean="0"/>
+              <a:rPr lang="en-US" i="1" dirty="0" err="1"/>
               <a:t>foo</a:t>
             </a:r>
             <a:r>
-              <a:rPr lang="en-US" i="1" dirty="0" smtClean="0"/>
+              <a:rPr lang="en-US" i="1" dirty="0"/>
               <a:t> = new Foo();</a:t>
             </a:r>
           </a:p>
@@ -4164,11 +4122,11 @@
               <a:buNone/>
             </a:pPr>
             <a:r>
-              <a:rPr lang="en-US" i="1" dirty="0" err="1" smtClean="0"/>
+              <a:rPr lang="en-US" i="1" dirty="0" err="1"/>
               <a:t>set.add</a:t>
             </a:r>
             <a:r>
-              <a:rPr lang="en-US" i="1" dirty="0" smtClean="0"/>
+              <a:rPr lang="en-US" i="1" dirty="0"/>
               <a:t>(foo);</a:t>
             </a:r>
           </a:p>
@@ -4177,19 +4135,19 @@
               <a:buNone/>
             </a:pPr>
             <a:r>
-              <a:rPr lang="en-US" i="1" dirty="0" err="1" smtClean="0"/>
+              <a:rPr lang="en-US" i="1" dirty="0" err="1"/>
               <a:t>assertTrue</a:t>
             </a:r>
             <a:r>
-              <a:rPr lang="en-US" i="1" dirty="0" smtClean="0"/>
+              <a:rPr lang="en-US" i="1" dirty="0"/>
               <a:t>(</a:t>
             </a:r>
             <a:r>
-              <a:rPr lang="en-US" i="1" dirty="0" err="1" smtClean="0"/>
+              <a:rPr lang="en-US" i="1" dirty="0" err="1"/>
               <a:t>set.contains</a:t>
             </a:r>
             <a:r>
-              <a:rPr lang="en-US" i="1" dirty="0" smtClean="0"/>
+              <a:rPr lang="en-US" i="1" dirty="0"/>
               <a:t>(foo));</a:t>
             </a:r>
           </a:p>
@@ -4198,7 +4156,7 @@
               <a:buNone/>
             </a:pPr>
             <a:r>
-              <a:rPr lang="en-US" i="1" dirty="0" smtClean="0"/>
+              <a:rPr lang="en-US" i="1" dirty="0"/>
               <a:t>// h(foo) = 42  ,  42 % M = 2</a:t>
             </a:r>
           </a:p>
@@ -4207,11 +4165,11 @@
               <a:buNone/>
             </a:pPr>
             <a:r>
-              <a:rPr lang="en-US" i="1" dirty="0" err="1" smtClean="0"/>
+              <a:rPr lang="en-US" i="1" dirty="0" err="1"/>
               <a:t>foo.setSomeVariable</a:t>
             </a:r>
             <a:r>
-              <a:rPr lang="en-US" i="1" dirty="0" smtClean="0"/>
+              <a:rPr lang="en-US" i="1" dirty="0"/>
               <a:t>(…);</a:t>
             </a:r>
           </a:p>
@@ -4220,16 +4178,8 @@
               <a:buNone/>
             </a:pPr>
             <a:r>
-              <a:rPr lang="en-US" i="1" dirty="0" smtClean="0"/>
-              <a:t>// </a:t>
-            </a:r>
-            <a:r>
               <a:rPr lang="en-US" i="1" dirty="0"/>
-              <a:t>h(foo</a:t>
-            </a:r>
-            <a:r>
-              <a:rPr lang="en-US" i="1" dirty="0" smtClean="0"/>
-              <a:t>) = 55  ,  55 % M = 5</a:t>
+              <a:t>// h(foo) = 55  ,  55 % M = 5</a:t>
             </a:r>
           </a:p>
           <a:p>
@@ -4237,22 +4187,21 @@
               <a:buNone/>
             </a:pPr>
             <a:r>
-              <a:rPr lang="en-US" i="1" dirty="0" err="1" smtClean="0"/>
+              <a:rPr lang="en-US" i="1" dirty="0" err="1"/>
               <a:t>assertFalse</a:t>
             </a:r>
             <a:r>
-              <a:rPr lang="en-US" i="1" dirty="0" smtClean="0"/>
+              <a:rPr lang="en-US" i="1" dirty="0"/>
               <a:t>(</a:t>
             </a:r>
             <a:r>
-              <a:rPr lang="en-US" i="1" dirty="0" err="1" smtClean="0"/>
+              <a:rPr lang="en-US" i="1" dirty="0" err="1"/>
               <a:t>set.contains</a:t>
             </a:r>
             <a:r>
-              <a:rPr lang="en-US" i="1" dirty="0" smtClean="0"/>
+              <a:rPr lang="en-US" i="1" dirty="0"/>
               <a:t>(foo));</a:t>
             </a:r>
-            <a:endParaRPr lang="en-US" i="1" dirty="0"/>
           </a:p>
         </p:txBody>
       </p:sp>
@@ -4330,10 +4279,9 @@
                     <a:lstStyle/>
                     <a:p>
                       <a:r>
-                        <a:rPr lang="en-US" sz="2400" dirty="0" smtClean="0"/>
+                        <a:rPr lang="en-US" sz="2400" dirty="0"/>
                         <a:t>foo</a:t>
                       </a:r>
-                      <a:endParaRPr lang="en-US" sz="2400" dirty="0"/>
                     </a:p>
                   </a:txBody>
                   <a:tcPr>
@@ -4392,10 +4340,9 @@
                     <a:lstStyle/>
                     <a:p>
                       <a:r>
-                        <a:rPr lang="en-US" sz="2400" dirty="0" smtClean="0"/>
+                        <a:rPr lang="en-US" sz="2400" dirty="0"/>
                         <a:t>miss</a:t>
                       </a:r>
-                      <a:endParaRPr lang="en-US" sz="2400" dirty="0"/>
                     </a:p>
                   </a:txBody>
                   <a:tcPr/>
@@ -4687,10 +4634,9 @@
           <a:lstStyle/>
           <a:p>
             <a:r>
-              <a:rPr lang="en-US" dirty="0" smtClean="0"/>
+              <a:rPr lang="en-US" dirty="0"/>
               <a:t>Using Maps and Sets</a:t>
             </a:r>
-            <a:endParaRPr lang="en-US" dirty="0"/>
           </a:p>
         </p:txBody>
       </p:sp>
@@ -4717,83 +4663,83 @@
           <a:lstStyle/>
           <a:p>
             <a:r>
-              <a:rPr lang="en-US" dirty="0" smtClean="0"/>
+              <a:rPr lang="en-US" dirty="0"/>
               <a:t>Can only use a </a:t>
             </a:r>
             <a:r>
-              <a:rPr lang="en-US" i="1" dirty="0" smtClean="0"/>
+              <a:rPr lang="en-US" i="1" dirty="0"/>
               <a:t>Set</a:t>
             </a:r>
             <a:r>
-              <a:rPr lang="en-US" dirty="0" smtClean="0"/>
+              <a:rPr lang="en-US" dirty="0"/>
               <a:t> for </a:t>
             </a:r>
             <a:r>
-              <a:rPr lang="en-US" b="1" dirty="0" smtClean="0"/>
+              <a:rPr lang="en-US" b="1" dirty="0"/>
               <a:t>immutable</a:t>
             </a:r>
             <a:r>
-              <a:rPr lang="en-US" dirty="0" smtClean="0"/>
+              <a:rPr lang="en-US" dirty="0"/>
               <a:t> types</a:t>
             </a:r>
           </a:p>
           <a:p>
             <a:r>
-              <a:rPr lang="en-US" dirty="0" smtClean="0"/>
+              <a:rPr lang="en-US" dirty="0"/>
               <a:t>What if you need a collection of mutable types </a:t>
             </a:r>
             <a:r>
-              <a:rPr lang="en-US" i="1" dirty="0" smtClean="0"/>
+              <a:rPr lang="en-US" i="1" dirty="0"/>
               <a:t>&lt;X&gt;</a:t>
             </a:r>
             <a:r>
-              <a:rPr lang="en-US" dirty="0" smtClean="0"/>
+              <a:rPr lang="en-US" dirty="0"/>
               <a:t>? </a:t>
             </a:r>
           </a:p>
           <a:p>
             <a:pPr lvl="1"/>
             <a:r>
-              <a:rPr lang="en-US" dirty="0" smtClean="0"/>
+              <a:rPr lang="en-US" dirty="0"/>
               <a:t>creating a </a:t>
             </a:r>
             <a:r>
-              <a:rPr lang="en-US" i="1" dirty="0" smtClean="0"/>
+              <a:rPr lang="en-US" i="1" dirty="0"/>
               <a:t>Set&lt;X&gt;</a:t>
             </a:r>
             <a:r>
-              <a:rPr lang="en-US" dirty="0" smtClean="0"/>
+              <a:rPr lang="en-US" dirty="0"/>
               <a:t> would wrong! </a:t>
             </a:r>
           </a:p>
           <a:p>
             <a:r>
-              <a:rPr lang="en-US" dirty="0" smtClean="0"/>
+              <a:rPr lang="en-US" dirty="0"/>
               <a:t>Option 1: rather use a list, </a:t>
             </a:r>
             <a:r>
-              <a:rPr lang="en-US" dirty="0" err="1" smtClean="0"/>
+              <a:rPr lang="en-US" dirty="0" err="1"/>
               <a:t>eg</a:t>
             </a:r>
             <a:r>
-              <a:rPr lang="en-US" dirty="0" smtClean="0"/>
+              <a:rPr lang="en-US" dirty="0"/>
               <a:t> </a:t>
             </a:r>
             <a:r>
-              <a:rPr lang="en-US" i="1" dirty="0" smtClean="0"/>
+              <a:rPr lang="en-US" i="1" dirty="0"/>
               <a:t>List&lt;X&gt;</a:t>
             </a:r>
           </a:p>
           <a:p>
             <a:pPr lvl="1"/>
             <a:r>
-              <a:rPr lang="en-US" dirty="0" smtClean="0"/>
+              <a:rPr lang="en-US" dirty="0"/>
               <a:t>however, it would allow duplicates</a:t>
             </a:r>
           </a:p>
           <a:p>
             <a:r>
-              <a:rPr lang="en-US" dirty="0" smtClean="0"/>
+              <a:rPr lang="en-US" dirty="0"/>
               <a:t>Option 2: use a map </a:t>
             </a:r>
             <a:r>
@@ -4802,53 +4748,49 @@
             </a:r>
             <a:r>
               <a:rPr lang="en-US" dirty="0"/>
-              <a:t> </a:t>
-            </a:r>
-            <a:r>
-              <a:rPr lang="en-US" dirty="0" smtClean="0"/>
-              <a:t>where the key is an immutable field derived from </a:t>
-            </a:r>
-            <a:r>
-              <a:rPr lang="en-US" i="1" dirty="0" smtClean="0"/>
+              <a:t> where the key is an immutable field derived from </a:t>
+            </a:r>
+            <a:r>
+              <a:rPr lang="en-US" i="1" dirty="0"/>
               <a:t>X</a:t>
             </a:r>
           </a:p>
           <a:p>
             <a:pPr lvl="1"/>
             <a:r>
-              <a:rPr lang="en-US" dirty="0" err="1" smtClean="0"/>
+              <a:rPr lang="en-US" dirty="0" err="1"/>
               <a:t>eg</a:t>
             </a:r>
             <a:r>
-              <a:rPr lang="en-US" dirty="0" smtClean="0"/>
+              <a:rPr lang="en-US" dirty="0"/>
               <a:t>, if mutable </a:t>
             </a:r>
             <a:r>
-              <a:rPr lang="en-US" i="1" dirty="0" smtClean="0"/>
+              <a:rPr lang="en-US" i="1" dirty="0"/>
               <a:t>User</a:t>
             </a:r>
             <a:r>
-              <a:rPr lang="en-US" dirty="0" smtClean="0"/>
+              <a:rPr lang="en-US" dirty="0"/>
               <a:t>, </a:t>
             </a:r>
             <a:r>
-              <a:rPr lang="en-US" i="1" dirty="0" err="1" smtClean="0"/>
+              <a:rPr lang="en-US" i="1" dirty="0" err="1"/>
               <a:t>map.put</a:t>
             </a:r>
             <a:r>
-              <a:rPr lang="en-US" i="1" dirty="0" smtClean="0"/>
+              <a:rPr lang="en-US" i="1" dirty="0"/>
               <a:t>(</a:t>
             </a:r>
             <a:r>
-              <a:rPr lang="en-US" i="1" dirty="0" err="1" smtClean="0"/>
+              <a:rPr lang="en-US" i="1" dirty="0" err="1"/>
               <a:t>user.getId</a:t>
             </a:r>
             <a:r>
-              <a:rPr lang="en-US" i="1" dirty="0" smtClean="0"/>
+              <a:rPr lang="en-US" i="1" dirty="0"/>
               <a:t>(), user)</a:t>
             </a:r>
             <a:r>
-              <a:rPr lang="en-US" dirty="0" smtClean="0"/>
+              <a:rPr lang="en-US" dirty="0"/>
               <a:t>, where the id could be a String (recall strings are immutable)</a:t>
             </a:r>
           </a:p>
@@ -4905,10 +4847,9 @@
           <a:lstStyle/>
           <a:p>
             <a:r>
-              <a:rPr lang="en-US" dirty="0" smtClean="0"/>
+              <a:rPr lang="en-US" dirty="0"/>
               <a:t>Homework</a:t>
             </a:r>
-            <a:endParaRPr lang="en-US" dirty="0"/>
           </a:p>
         </p:txBody>
       </p:sp>
@@ -4933,44 +4874,39 @@
             </a:r>
             <a:r>
               <a:rPr lang="en-US"/>
-              <a:t>Chapter </a:t>
-            </a:r>
-            <a:r>
-              <a:rPr lang="en-US" smtClean="0"/>
-              <a:t>3.4 and 3.5</a:t>
-            </a:r>
-            <a:endParaRPr lang="en-US" dirty="0" smtClean="0"/>
-          </a:p>
-          <a:p>
-            <a:r>
-              <a:rPr lang="en-US" dirty="0" smtClean="0"/>
+              <a:t>Chapter 3.4 and 3.5</a:t>
+            </a:r>
+            <a:endParaRPr lang="en-US" dirty="0"/>
+          </a:p>
+          <a:p>
+            <a:r>
+              <a:rPr lang="en-US" dirty="0"/>
               <a:t>Study code in the </a:t>
             </a:r>
             <a:r>
-              <a:rPr lang="en-US" i="1" dirty="0" smtClean="0"/>
+              <a:rPr lang="en-US" i="1" dirty="0"/>
               <a:t>org.pg4200.les06</a:t>
             </a:r>
             <a:r>
-              <a:rPr lang="en-US" dirty="0" smtClean="0"/>
+              <a:rPr lang="en-US" dirty="0"/>
               <a:t> package</a:t>
             </a:r>
           </a:p>
           <a:p>
             <a:r>
-              <a:rPr lang="en-US" dirty="0" smtClean="0"/>
+              <a:rPr lang="en-US" dirty="0"/>
               <a:t>Do exercises in </a:t>
             </a:r>
             <a:r>
-              <a:rPr lang="en-US" i="1" dirty="0" smtClean="0"/>
+              <a:rPr lang="en-US" i="1" dirty="0"/>
               <a:t>exercises/ex06</a:t>
             </a:r>
           </a:p>
           <a:p>
             <a:r>
-              <a:rPr lang="en-US" dirty="0" smtClean="0"/>
+              <a:rPr lang="en-US" dirty="0"/>
               <a:t>Extra: do exercises in the book</a:t>
             </a:r>
-            <a:endParaRPr lang="en-US" dirty="0"/>
           </a:p>
         </p:txBody>
       </p:sp>
@@ -4985,13 +4921,6 @@
     <a:masterClrMapping/>
   </p:clrMapOvr>
   <p:transition spd="med"/>
-  <p:timing>
-    <p:tnLst>
-      <p:par>
-        <p:cTn id="1" dur="indefinite" restart="never" nodeType="tmRoot"/>
-      </p:par>
-    </p:tnLst>
-  </p:timing>
 </p:sld>
 </file>
 
@@ -5028,10 +4957,9 @@
           <a:lstStyle/>
           <a:p>
             <a:r>
-              <a:rPr lang="en-US" dirty="0" smtClean="0"/>
+              <a:rPr lang="en-US" dirty="0"/>
               <a:t>Hash Function</a:t>
             </a:r>
-            <a:endParaRPr lang="en-US" dirty="0"/>
           </a:p>
         </p:txBody>
       </p:sp>
@@ -5056,7 +4984,7 @@
           <a:lstStyle/>
           <a:p>
             <a:r>
-              <a:rPr lang="en-US" dirty="0" smtClean="0"/>
+              <a:rPr lang="en-US" dirty="0"/>
               <a:t>A function that maps data from an arbitrary size to a specific size</a:t>
             </a:r>
           </a:p>
@@ -5064,42 +4992,33 @@
             <a:pPr lvl="1"/>
             <a:r>
               <a:rPr lang="en-US" dirty="0" err="1"/>
-              <a:t>e</a:t>
-            </a:r>
-            <a:r>
-              <a:rPr lang="en-US" dirty="0" err="1" smtClean="0"/>
-              <a:t>g</a:t>
-            </a:r>
-            <a:r>
-              <a:rPr lang="en-US" dirty="0" smtClean="0"/>
+              <a:t>eg</a:t>
+            </a:r>
+            <a:r>
+              <a:rPr lang="en-US" dirty="0"/>
               <a:t>, mapping strings to a </a:t>
             </a:r>
             <a:r>
-              <a:rPr lang="en-US" dirty="0" err="1" smtClean="0"/>
+              <a:rPr lang="en-US" dirty="0" err="1"/>
               <a:t>int</a:t>
             </a:r>
-            <a:endParaRPr lang="en-US" dirty="0" smtClean="0"/>
+            <a:endParaRPr lang="en-US" dirty="0"/>
           </a:p>
           <a:p>
             <a:r>
               <a:rPr lang="en-US" i="1" dirty="0"/>
-              <a:t>h</a:t>
-            </a:r>
-            <a:r>
-              <a:rPr lang="en-US" i="1" dirty="0" smtClean="0"/>
-              <a:t>(x)=y</a:t>
-            </a:r>
-            <a:r>
-              <a:rPr lang="en-US" dirty="0" smtClean="0"/>
+              <a:t>h(x)=y</a:t>
+            </a:r>
+            <a:r>
+              <a:rPr lang="en-US" dirty="0"/>
               <a:t> , mapping from domain X to a value in domain Y</a:t>
             </a:r>
           </a:p>
           <a:p>
             <a:r>
-              <a:rPr lang="en-US" dirty="0" smtClean="0"/>
+              <a:rPr lang="en-US" dirty="0"/>
               <a:t>|X| is often much larger than |Y|</a:t>
             </a:r>
-            <a:endParaRPr lang="en-US" dirty="0"/>
           </a:p>
         </p:txBody>
       </p:sp>
@@ -5150,10 +5069,9 @@
           <a:lstStyle/>
           <a:p>
             <a:r>
-              <a:rPr lang="en-US" dirty="0" smtClean="0"/>
+              <a:rPr lang="en-US" dirty="0"/>
               <a:t>Hash Properties</a:t>
             </a:r>
-            <a:endParaRPr lang="en-US" dirty="0"/>
           </a:p>
         </p:txBody>
       </p:sp>
@@ -5178,74 +5096,74 @@
           <a:lstStyle/>
           <a:p>
             <a:r>
-              <a:rPr lang="en-US" i="1" dirty="0" smtClean="0"/>
+              <a:rPr lang="en-US" i="1" dirty="0"/>
               <a:t>Deterministic</a:t>
             </a:r>
             <a:r>
-              <a:rPr lang="en-US" dirty="0" smtClean="0"/>
+              <a:rPr lang="en-US" dirty="0"/>
               <a:t>: for a given input </a:t>
             </a:r>
             <a:r>
-              <a:rPr lang="en-US" i="1" dirty="0" smtClean="0"/>
+              <a:rPr lang="en-US" i="1" dirty="0"/>
               <a:t>x’</a:t>
             </a:r>
             <a:r>
-              <a:rPr lang="en-US" dirty="0" smtClean="0"/>
+              <a:rPr lang="en-US" dirty="0"/>
               <a:t>, should always get the same output </a:t>
             </a:r>
             <a:r>
-              <a:rPr lang="en-US" i="1" dirty="0" smtClean="0"/>
+              <a:rPr lang="en-US" i="1" dirty="0"/>
               <a:t>y’</a:t>
             </a:r>
           </a:p>
           <a:p>
             <a:r>
-              <a:rPr lang="en-US" i="1" dirty="0" smtClean="0"/>
+              <a:rPr lang="en-US" i="1" dirty="0"/>
               <a:t>Uniform</a:t>
             </a:r>
             <a:r>
-              <a:rPr lang="en-US" dirty="0" smtClean="0"/>
+              <a:rPr lang="en-US" dirty="0"/>
               <a:t>: mapping from X to Y should be ideally spread uniformly over Y,</a:t>
             </a:r>
           </a:p>
           <a:p>
             <a:pPr lvl="1"/>
             <a:r>
-              <a:rPr lang="en-US" dirty="0" smtClean="0"/>
+              <a:rPr lang="en-US" dirty="0"/>
               <a:t> </a:t>
             </a:r>
             <a:r>
-              <a:rPr lang="en-US" dirty="0" err="1" smtClean="0"/>
+              <a:rPr lang="en-US" dirty="0" err="1"/>
               <a:t>ie</a:t>
             </a:r>
             <a:r>
-              <a:rPr lang="en-US" dirty="0" smtClean="0"/>
+              <a:rPr lang="en-US" dirty="0"/>
               <a:t> the number of elements in X that map to a specific </a:t>
             </a:r>
             <a:r>
-              <a:rPr lang="en-US" i="1" dirty="0" smtClean="0"/>
+              <a:rPr lang="en-US" i="1" dirty="0"/>
               <a:t>y’</a:t>
             </a:r>
             <a:r>
-              <a:rPr lang="en-US" dirty="0" smtClean="0"/>
+              <a:rPr lang="en-US" dirty="0"/>
               <a:t> should be close to |X|/|Y|</a:t>
             </a:r>
           </a:p>
           <a:p>
             <a:r>
-              <a:rPr lang="en-US" i="1" dirty="0" smtClean="0"/>
+              <a:rPr lang="en-US" i="1" dirty="0"/>
               <a:t>Performance</a:t>
             </a:r>
             <a:r>
-              <a:rPr lang="en-US" dirty="0" smtClean="0"/>
+              <a:rPr lang="en-US" dirty="0"/>
               <a:t>: either fast (in this course) or slow (security, </a:t>
             </a:r>
             <a:r>
-              <a:rPr lang="en-US" dirty="0" err="1" smtClean="0"/>
+              <a:rPr lang="en-US" dirty="0" err="1"/>
               <a:t>eg</a:t>
             </a:r>
             <a:r>
-              <a:rPr lang="en-US" dirty="0" smtClean="0"/>
+              <a:rPr lang="en-US" dirty="0"/>
               <a:t> hashing of passwords)</a:t>
             </a:r>
             <a:endParaRPr lang="en-US" i="1" dirty="0"/>
@@ -5306,10 +5224,9 @@
           <a:lstStyle/>
           <a:p>
             <a:r>
-              <a:rPr lang="en-US" dirty="0" smtClean="0"/>
+              <a:rPr lang="en-US" dirty="0"/>
               <a:t>Collisions</a:t>
             </a:r>
-            <a:endParaRPr lang="en-US" dirty="0"/>
           </a:p>
         </p:txBody>
       </p:sp>
@@ -5341,15 +5258,15 @@
               </a:spcBef>
             </a:pPr>
             <a:r>
-              <a:rPr lang="en-US" dirty="0" smtClean="0"/>
+              <a:rPr lang="en-US" dirty="0"/>
               <a:t>If |X| &gt; |Y|, you cannot avoid </a:t>
             </a:r>
             <a:r>
-              <a:rPr lang="en-US" i="1" dirty="0" smtClean="0"/>
+              <a:rPr lang="en-US" i="1" dirty="0"/>
               <a:t>h(x’)=h(x’’), </a:t>
             </a:r>
             <a:r>
-              <a:rPr lang="en-US" dirty="0" smtClean="0"/>
+              <a:rPr lang="en-US" dirty="0"/>
               <a:t>two different values in X mapping to the same value in Y</a:t>
             </a:r>
           </a:p>
@@ -5360,14 +5277,13 @@
               </a:spcBef>
             </a:pPr>
             <a:r>
-              <a:rPr lang="en-US" dirty="0" smtClean="0"/>
+              <a:rPr lang="en-US" dirty="0"/>
               <a:t>Ideally, if uniform, no more than |X|/|Y| collisions per element</a:t>
             </a:r>
             <a:r>
-              <a:rPr lang="en-US" i="1" dirty="0" smtClean="0"/>
+              <a:rPr lang="en-US" i="1" dirty="0"/>
               <a:t> </a:t>
             </a:r>
-            <a:endParaRPr lang="en-US" i="1" dirty="0"/>
           </a:p>
         </p:txBody>
       </p:sp>
@@ -5673,7 +5589,7 @@
               <a:tabLst/>
             </a:pPr>
             <a:r>
-              <a:rPr kumimoji="0" lang="en-US" sz="3600" b="0" i="0" u="none" strike="noStrike" cap="none" spc="0" normalizeH="0" baseline="0" dirty="0" smtClean="0">
+              <a:rPr kumimoji="0" lang="en-US" sz="3600" b="0" i="0" u="none" strike="noStrike" cap="none" spc="0" normalizeH="0" baseline="0" dirty="0">
                 <a:ln>
                   <a:noFill/>
                 </a:ln>
@@ -5689,20 +5605,6 @@
               </a:rPr>
               <a:t>X</a:t>
             </a:r>
-            <a:endParaRPr kumimoji="0" lang="en-US" sz="3600" b="0" i="0" u="none" strike="noStrike" cap="none" spc="0" normalizeH="0" baseline="0" dirty="0">
-              <a:ln>
-                <a:noFill/>
-              </a:ln>
-              <a:solidFill>
-                <a:srgbClr val="000000"/>
-              </a:solidFill>
-              <a:effectLst/>
-              <a:uFillTx/>
-              <a:latin typeface="+mn-lt"/>
-              <a:ea typeface="+mn-ea"/>
-              <a:cs typeface="+mn-cs"/>
-              <a:sym typeface="Helvetica Light"/>
-            </a:endParaRPr>
           </a:p>
         </p:txBody>
       </p:sp>
@@ -6088,7 +5990,7 @@
               <a:tabLst/>
             </a:pPr>
             <a:r>
-              <a:rPr lang="en-US" dirty="0" smtClean="0"/>
+              <a:rPr lang="en-US" dirty="0"/>
               <a:t>42</a:t>
             </a:r>
             <a:endParaRPr kumimoji="0" lang="en-US" sz="3600" b="0" i="0" u="none" strike="noStrike" cap="none" spc="0" normalizeH="0" baseline="0" dirty="0">
@@ -6165,7 +6067,7 @@
               <a:tabLst/>
             </a:pPr>
             <a:r>
-              <a:rPr kumimoji="0" lang="en-US" sz="3600" b="0" i="0" u="none" strike="noStrike" cap="none" spc="0" normalizeH="0" baseline="0" dirty="0" smtClean="0">
+              <a:rPr kumimoji="0" lang="en-US" sz="3600" b="0" i="0" u="none" strike="noStrike" cap="none" spc="0" normalizeH="0" baseline="0" dirty="0">
                 <a:ln>
                   <a:noFill/>
                 </a:ln>
@@ -6181,20 +6083,6 @@
               </a:rPr>
               <a:t>“foo”</a:t>
             </a:r>
-            <a:endParaRPr kumimoji="0" lang="en-US" sz="3600" b="0" i="0" u="none" strike="noStrike" cap="none" spc="0" normalizeH="0" baseline="0" dirty="0">
-              <a:ln>
-                <a:noFill/>
-              </a:ln>
-              <a:solidFill>
-                <a:srgbClr val="000000"/>
-              </a:solidFill>
-              <a:effectLst/>
-              <a:uFillTx/>
-              <a:latin typeface="+mn-lt"/>
-              <a:ea typeface="+mn-ea"/>
-              <a:cs typeface="+mn-cs"/>
-              <a:sym typeface="Helvetica Light"/>
-            </a:endParaRPr>
           </a:p>
         </p:txBody>
       </p:sp>
@@ -6255,7 +6143,7 @@
               <a:tabLst/>
             </a:pPr>
             <a:r>
-              <a:rPr kumimoji="0" lang="en-US" sz="3600" b="0" i="0" u="none" strike="noStrike" cap="none" spc="0" normalizeH="0" baseline="0" dirty="0" smtClean="0">
+              <a:rPr kumimoji="0" lang="en-US" sz="3600" b="0" i="0" u="none" strike="noStrike" cap="none" spc="0" normalizeH="0" baseline="0" dirty="0">
                 <a:ln>
                   <a:noFill/>
                 </a:ln>
@@ -6271,20 +6159,6 @@
               </a:rPr>
               <a:t>“bar”</a:t>
             </a:r>
-            <a:endParaRPr kumimoji="0" lang="en-US" sz="3600" b="0" i="0" u="none" strike="noStrike" cap="none" spc="0" normalizeH="0" baseline="0" dirty="0">
-              <a:ln>
-                <a:noFill/>
-              </a:ln>
-              <a:solidFill>
-                <a:srgbClr val="000000"/>
-              </a:solidFill>
-              <a:effectLst/>
-              <a:uFillTx/>
-              <a:latin typeface="+mn-lt"/>
-              <a:ea typeface="+mn-ea"/>
-              <a:cs typeface="+mn-cs"/>
-              <a:sym typeface="Helvetica Light"/>
-            </a:endParaRPr>
           </a:p>
         </p:txBody>
       </p:sp>
@@ -6335,10 +6209,9 @@
           <a:lstStyle/>
           <a:p>
             <a:r>
-              <a:rPr lang="en-US" dirty="0" smtClean="0"/>
+              <a:rPr lang="en-US" dirty="0"/>
               <a:t>Hash Maps</a:t>
             </a:r>
-            <a:endParaRPr lang="en-US" dirty="0"/>
           </a:p>
         </p:txBody>
       </p:sp>
@@ -6363,57 +6236,53 @@
           <a:lstStyle/>
           <a:p>
             <a:r>
-              <a:rPr lang="en-US" dirty="0" smtClean="0"/>
+              <a:rPr lang="en-US" dirty="0"/>
               <a:t>Still a map from a K key to a V value</a:t>
             </a:r>
           </a:p>
           <a:p>
             <a:r>
-              <a:rPr lang="en-US" dirty="0" smtClean="0"/>
+              <a:rPr lang="en-US" dirty="0"/>
               <a:t>No requirement on ordering of K keys, just being able to compute an </a:t>
             </a:r>
             <a:r>
-              <a:rPr lang="en-US" i="1" dirty="0" smtClean="0"/>
+              <a:rPr lang="en-US" i="1" dirty="0"/>
               <a:t>hash</a:t>
             </a:r>
             <a:r>
-              <a:rPr lang="en-US" dirty="0" smtClean="0"/>
+              <a:rPr lang="en-US" dirty="0"/>
               <a:t> of it</a:t>
             </a:r>
           </a:p>
           <a:p>
             <a:r>
-              <a:rPr lang="en-US" dirty="0" smtClean="0"/>
+              <a:rPr lang="en-US" dirty="0"/>
               <a:t>In Java, all objects inherits from </a:t>
             </a:r>
             <a:r>
-              <a:rPr lang="en-US" i="1" dirty="0" err="1" smtClean="0"/>
+              <a:rPr lang="en-US" i="1" dirty="0" err="1"/>
               <a:t>java.lang.Object</a:t>
             </a:r>
             <a:r>
-              <a:rPr lang="en-US" dirty="0" smtClean="0"/>
-              <a:t>, which defines </a:t>
-            </a:r>
-            <a:r>
-              <a:rPr lang="en-US" dirty="0"/>
-              <a:t>a </a:t>
-            </a:r>
-            <a:r>
-              <a:rPr lang="en-US" i="1" dirty="0" err="1" smtClean="0"/>
+              <a:rPr lang="en-US" dirty="0"/>
+              <a:t>, which defines a </a:t>
+            </a:r>
+            <a:r>
+              <a:rPr lang="en-US" i="1" dirty="0" err="1"/>
               <a:t>hashCode</a:t>
             </a:r>
             <a:r>
-              <a:rPr lang="en-US" i="1" dirty="0" smtClean="0"/>
+              <a:rPr lang="en-US" i="1" dirty="0"/>
               <a:t>()</a:t>
             </a:r>
             <a:r>
-              <a:rPr lang="en-US" dirty="0" smtClean="0"/>
+              <a:rPr lang="en-US" dirty="0"/>
               <a:t> method</a:t>
             </a:r>
           </a:p>
           <a:p>
             <a:r>
-              <a:rPr lang="en-US" dirty="0" smtClean="0"/>
+              <a:rPr lang="en-US" dirty="0"/>
               <a:t>Hash code used as an index for an internal array</a:t>
             </a:r>
           </a:p>
@@ -6469,10 +6338,9 @@
           <a:lstStyle/>
           <a:p>
             <a:r>
-              <a:rPr lang="en-US" dirty="0" smtClean="0"/>
+              <a:rPr lang="en-US" dirty="0"/>
               <a:t>Example</a:t>
             </a:r>
-            <a:endParaRPr lang="en-US" dirty="0"/>
           </a:p>
         </p:txBody>
       </p:sp>
@@ -6498,40 +6366,32 @@
           <a:p>
             <a:r>
               <a:rPr lang="en-US" i="1" dirty="0"/>
-              <a:t>put(“foo”, v</a:t>
-            </a:r>
-            <a:r>
-              <a:rPr lang="en-US" i="1" dirty="0" smtClean="0"/>
-              <a:t>)</a:t>
-            </a:r>
-          </a:p>
-          <a:p>
-            <a:r>
-              <a:rPr lang="en-US" i="1" dirty="0" smtClean="0"/>
+              <a:t>put(“foo”, v)</a:t>
+            </a:r>
+          </a:p>
+          <a:p>
+            <a:r>
+              <a:rPr lang="en-US" i="1" dirty="0"/>
               <a:t>h(“foo”)=42</a:t>
             </a:r>
           </a:p>
           <a:p>
             <a:r>
               <a:rPr lang="en-US" i="1" dirty="0"/>
-              <a:t>h</a:t>
-            </a:r>
-            <a:r>
-              <a:rPr lang="en-US" i="1" dirty="0" smtClean="0"/>
-              <a:t>(“foo”)%10 = 2</a:t>
-            </a:r>
-          </a:p>
-          <a:p>
-            <a:r>
-              <a:rPr lang="en-US" dirty="0" smtClean="0"/>
+              <a:t>h(“foo”)%10 = 2</a:t>
+            </a:r>
+          </a:p>
+          <a:p>
+            <a:r>
+              <a:rPr lang="en-US" dirty="0"/>
               <a:t>Benefit: operations (insert/search/</a:t>
             </a:r>
             <a:r>
-              <a:rPr lang="en-US" dirty="0" err="1" smtClean="0"/>
+              <a:rPr lang="en-US" dirty="0" err="1"/>
               <a:t>etc</a:t>
             </a:r>
             <a:r>
-              <a:rPr lang="en-US" dirty="0" smtClean="0"/>
+              <a:rPr lang="en-US" dirty="0"/>
               <a:t>) have cost due to hash independent of size N of the collection</a:t>
             </a:r>
           </a:p>
@@ -6611,10 +6471,9 @@
                     <a:lstStyle/>
                     <a:p>
                       <a:r>
-                        <a:rPr lang="en-US" sz="2400" dirty="0" smtClean="0"/>
+                        <a:rPr lang="en-US" sz="2400" dirty="0"/>
                         <a:t>[2] = v</a:t>
                       </a:r>
-                      <a:endParaRPr lang="en-US" sz="2400" dirty="0"/>
                     </a:p>
                   </a:txBody>
                   <a:tcPr>
@@ -6812,7 +6671,7 @@
               <a:tabLst/>
             </a:pPr>
             <a:r>
-              <a:rPr kumimoji="0" lang="en-US" sz="3600" b="0" i="0" u="none" strike="noStrike" cap="none" spc="0" normalizeH="0" baseline="0" dirty="0" smtClean="0">
+              <a:rPr kumimoji="0" lang="en-US" sz="3600" b="0" i="0" u="none" strike="noStrike" cap="none" spc="0" normalizeH="0" baseline="0" dirty="0">
                 <a:ln>
                   <a:noFill/>
                 </a:ln>
@@ -6828,20 +6687,6 @@
               </a:rPr>
               <a:t>Internal array buffer of size M=10</a:t>
             </a:r>
-            <a:endParaRPr kumimoji="0" lang="en-US" sz="3600" b="0" i="0" u="none" strike="noStrike" cap="none" spc="0" normalizeH="0" baseline="0" dirty="0">
-              <a:ln>
-                <a:noFill/>
-              </a:ln>
-              <a:solidFill>
-                <a:srgbClr val="000000"/>
-              </a:solidFill>
-              <a:effectLst/>
-              <a:uFillTx/>
-              <a:latin typeface="+mn-lt"/>
-              <a:ea typeface="+mn-ea"/>
-              <a:cs typeface="+mn-cs"/>
-              <a:sym typeface="Helvetica Light"/>
-            </a:endParaRPr>
           </a:p>
         </p:txBody>
       </p:sp>
@@ -6892,10 +6737,9 @@
           <a:lstStyle/>
           <a:p>
             <a:r>
-              <a:rPr lang="en-US" dirty="0" smtClean="0"/>
+              <a:rPr lang="en-US" dirty="0"/>
               <a:t>What About Collisions?</a:t>
             </a:r>
-            <a:endParaRPr lang="en-US" dirty="0"/>
           </a:p>
         </p:txBody>
       </p:sp>
@@ -6921,53 +6765,41 @@
           <a:p>
             <a:r>
               <a:rPr lang="en-US" i="1" dirty="0"/>
-              <a:t>put(“foo”, v</a:t>
-            </a:r>
-            <a:r>
-              <a:rPr lang="en-US" i="1" dirty="0" smtClean="0"/>
-              <a:t>)</a:t>
+              <a:t>put(“foo”, v)</a:t>
             </a:r>
           </a:p>
           <a:p>
             <a:r>
               <a:rPr lang="en-US" i="1" dirty="0"/>
-              <a:t>p</a:t>
-            </a:r>
-            <a:r>
-              <a:rPr lang="en-US" i="1" dirty="0" smtClean="0"/>
-              <a:t>ut(“bar”, z)</a:t>
-            </a:r>
-          </a:p>
-          <a:p>
-            <a:r>
-              <a:rPr lang="en-US" i="1" dirty="0" smtClean="0"/>
+              <a:t>put(“bar”, z)</a:t>
+            </a:r>
+          </a:p>
+          <a:p>
+            <a:r>
+              <a:rPr lang="en-US" i="1" dirty="0"/>
               <a:t>h(“foo”)=h(“bar”)</a:t>
             </a:r>
           </a:p>
           <a:p>
             <a:pPr lvl="1"/>
             <a:r>
-              <a:rPr lang="en-US" dirty="0" err="1" smtClean="0"/>
+              <a:rPr lang="en-US" dirty="0" err="1"/>
               <a:t>ie</a:t>
             </a:r>
             <a:r>
-              <a:rPr lang="en-US" dirty="0" smtClean="0"/>
+              <a:rPr lang="en-US" dirty="0"/>
               <a:t>, collision due to same hash</a:t>
             </a:r>
           </a:p>
           <a:p>
             <a:r>
               <a:rPr lang="en-US" i="1" dirty="0"/>
-              <a:t>h</a:t>
-            </a:r>
-            <a:r>
-              <a:rPr lang="en-US" i="1" dirty="0" smtClean="0"/>
-              <a:t>(“foo”)%10 = 2</a:t>
-            </a:r>
-          </a:p>
-          <a:p>
-            <a:r>
-              <a:rPr lang="en-US" dirty="0" smtClean="0"/>
+              <a:t>h(“foo”)%10 = 2</a:t>
+            </a:r>
+          </a:p>
+          <a:p>
+            <a:r>
+              <a:rPr lang="en-US" dirty="0"/>
               <a:t>What to do?</a:t>
             </a:r>
           </a:p>
@@ -7047,10 +6879,9 @@
                     <a:lstStyle/>
                     <a:p>
                       <a:r>
-                        <a:rPr lang="en-US" sz="2400" dirty="0" smtClean="0"/>
+                        <a:rPr lang="en-US" sz="2400" dirty="0"/>
                         <a:t>v or z?</a:t>
                       </a:r>
-                      <a:endParaRPr lang="en-US" sz="2400" dirty="0"/>
                     </a:p>
                   </a:txBody>
                   <a:tcPr>
@@ -7248,7 +7079,7 @@
               <a:tabLst/>
             </a:pPr>
             <a:r>
-              <a:rPr kumimoji="0" lang="en-US" sz="3600" b="0" i="0" u="none" strike="noStrike" cap="none" spc="0" normalizeH="0" baseline="0" dirty="0" smtClean="0">
+              <a:rPr kumimoji="0" lang="en-US" sz="3600" b="0" i="0" u="none" strike="noStrike" cap="none" spc="0" normalizeH="0" baseline="0" dirty="0">
                 <a:ln>
                   <a:noFill/>
                 </a:ln>
@@ -7264,20 +7095,6 @@
               </a:rPr>
               <a:t>Internal array buffer of size M=10</a:t>
             </a:r>
-            <a:endParaRPr kumimoji="0" lang="en-US" sz="3600" b="0" i="0" u="none" strike="noStrike" cap="none" spc="0" normalizeH="0" baseline="0" dirty="0">
-              <a:ln>
-                <a:noFill/>
-              </a:ln>
-              <a:solidFill>
-                <a:srgbClr val="000000"/>
-              </a:solidFill>
-              <a:effectLst/>
-              <a:uFillTx/>
-              <a:latin typeface="+mn-lt"/>
-              <a:ea typeface="+mn-ea"/>
-              <a:cs typeface="+mn-cs"/>
-              <a:sym typeface="Helvetica Light"/>
-            </a:endParaRPr>
           </a:p>
         </p:txBody>
       </p:sp>
@@ -7328,10 +7145,9 @@
           <a:lstStyle/>
           <a:p>
             <a:r>
-              <a:rPr lang="en-US" dirty="0" smtClean="0"/>
+              <a:rPr lang="en-US" dirty="0"/>
               <a:t>Different Strategies</a:t>
             </a:r>
-            <a:endParaRPr lang="en-US" dirty="0"/>
           </a:p>
         </p:txBody>
       </p:sp>
@@ -7359,56 +7175,43 @@
           <a:p>
             <a:r>
               <a:rPr lang="en-US" i="1" dirty="0"/>
-              <a:t>put(“foo”, v</a:t>
-            </a:r>
-            <a:r>
-              <a:rPr lang="en-US" i="1" dirty="0" smtClean="0"/>
-              <a:t>)</a:t>
+              <a:t>put(“foo”, v)</a:t>
             </a:r>
           </a:p>
           <a:p>
             <a:r>
               <a:rPr lang="en-US" i="1" dirty="0"/>
-              <a:t>p</a:t>
-            </a:r>
-            <a:r>
-              <a:rPr lang="en-US" i="1" dirty="0" smtClean="0"/>
-              <a:t>ut(“bar”, z)</a:t>
-            </a:r>
-          </a:p>
-          <a:p>
-            <a:r>
-              <a:rPr lang="en-US" i="1" dirty="0" smtClean="0"/>
+              <a:t>put(“bar”, z)</a:t>
+            </a:r>
+          </a:p>
+          <a:p>
+            <a:r>
+              <a:rPr lang="en-US" i="1" dirty="0"/>
               <a:t>h(“foo”)=h(“bar”)</a:t>
             </a:r>
           </a:p>
           <a:p>
             <a:pPr lvl="1"/>
             <a:r>
-              <a:rPr lang="en-US" dirty="0" err="1" smtClean="0"/>
+              <a:rPr lang="en-US" dirty="0" err="1"/>
               <a:t>ie</a:t>
             </a:r>
             <a:r>
-              <a:rPr lang="en-US" dirty="0" smtClean="0"/>
+              <a:rPr lang="en-US" dirty="0"/>
               <a:t>, collision due to same hash</a:t>
             </a:r>
           </a:p>
           <a:p>
             <a:r>
-              <a:rPr lang="en-US" dirty="0" smtClean="0"/>
-              <a:t>Use list at each position sharing same </a:t>
-            </a:r>
-            <a:r>
-              <a:rPr lang="en-US" dirty="0" smtClean="0"/>
-              <a:t>hash</a:t>
-            </a:r>
-          </a:p>
-          <a:p>
-            <a:r>
-              <a:rPr lang="en-US" dirty="0" smtClean="0"/>
+              <a:rPr lang="en-US" dirty="0"/>
+              <a:t>Use list at each position sharing same hash</a:t>
+            </a:r>
+          </a:p>
+          <a:p>
+            <a:r>
+              <a:rPr lang="en-US" dirty="0"/>
               <a:t>Nodes containing keys and values</a:t>
             </a:r>
-            <a:endParaRPr lang="en-US" dirty="0" smtClean="0"/>
           </a:p>
         </p:txBody>
       </p:sp>
@@ -7683,7 +7486,7 @@
               <a:tabLst/>
             </a:pPr>
             <a:r>
-              <a:rPr kumimoji="0" lang="en-US" sz="3600" b="0" i="0" u="none" strike="noStrike" cap="none" spc="0" normalizeH="0" baseline="0" dirty="0" smtClean="0">
+              <a:rPr kumimoji="0" lang="en-US" sz="3600" b="0" i="0" u="none" strike="noStrike" cap="none" spc="0" normalizeH="0" baseline="0" dirty="0">
                 <a:ln>
                   <a:noFill/>
                 </a:ln>
@@ -7699,20 +7502,6 @@
               </a:rPr>
               <a:t>Internal array buffer of size M=10</a:t>
             </a:r>
-            <a:endParaRPr kumimoji="0" lang="en-US" sz="3600" b="0" i="0" u="none" strike="noStrike" cap="none" spc="0" normalizeH="0" baseline="0" dirty="0">
-              <a:ln>
-                <a:noFill/>
-              </a:ln>
-              <a:solidFill>
-                <a:srgbClr val="000000"/>
-              </a:solidFill>
-              <a:effectLst/>
-              <a:uFillTx/>
-              <a:latin typeface="+mn-lt"/>
-              <a:ea typeface="+mn-ea"/>
-              <a:cs typeface="+mn-cs"/>
-              <a:sym typeface="Helvetica Light"/>
-            </a:endParaRPr>
           </a:p>
         </p:txBody>
       </p:sp>
@@ -7781,7 +7570,7 @@
               <a:tabLst/>
             </a:pPr>
             <a:r>
-              <a:rPr kumimoji="0" lang="en-US" sz="2400" b="0" i="0" u="none" strike="noStrike" cap="none" spc="0" normalizeH="0" baseline="0" dirty="0" smtClean="0">
+              <a:rPr kumimoji="0" lang="en-US" sz="2400" b="0" i="0" u="none" strike="noStrike" cap="none" spc="0" normalizeH="0" baseline="0" dirty="0">
                 <a:ln>
                   <a:noFill/>
                 </a:ln>
@@ -7816,7 +7605,7 @@
               <a:tabLst/>
             </a:pPr>
             <a:r>
-              <a:rPr kumimoji="0" lang="en-US" sz="2400" b="0" i="0" u="none" strike="noStrike" cap="none" spc="0" normalizeH="0" baseline="0" dirty="0" smtClean="0">
+              <a:rPr kumimoji="0" lang="en-US" sz="2400" b="0" i="0" u="none" strike="noStrike" cap="none" spc="0" normalizeH="0" baseline="0" dirty="0">
                 <a:ln>
                   <a:noFill/>
                 </a:ln>
@@ -7832,20 +7621,6 @@
               </a:rPr>
               <a:t>v</a:t>
             </a:r>
-            <a:endParaRPr kumimoji="0" lang="en-US" sz="2400" b="0" i="0" u="none" strike="noStrike" cap="none" spc="0" normalizeH="0" baseline="0" dirty="0">
-              <a:ln>
-                <a:noFill/>
-              </a:ln>
-              <a:solidFill>
-                <a:schemeClr val="tx1"/>
-              </a:solidFill>
-              <a:effectLst/>
-              <a:uFillTx/>
-              <a:latin typeface="+mn-lt"/>
-              <a:ea typeface="+mn-ea"/>
-              <a:cs typeface="+mn-cs"/>
-              <a:sym typeface="Helvetica Light"/>
-            </a:endParaRPr>
           </a:p>
         </p:txBody>
       </p:sp>
@@ -7914,7 +7689,7 @@
               <a:tabLst/>
             </a:pPr>
             <a:r>
-              <a:rPr lang="en-US" sz="2400" dirty="0" smtClean="0">
+              <a:rPr lang="en-US" sz="2400" dirty="0">
                 <a:solidFill>
                   <a:schemeClr val="tx1"/>
                 </a:solidFill>
@@ -7922,7 +7697,7 @@
               <a:t>“</a:t>
             </a:r>
             <a:r>
-              <a:rPr lang="en-US" sz="2400" dirty="0" err="1" smtClean="0">
+              <a:rPr lang="en-US" sz="2400" dirty="0" err="1">
                 <a:solidFill>
                   <a:schemeClr val="tx1"/>
                 </a:solidFill>
@@ -8069,13 +7844,13 @@
           <p:nvPr>
             <p:extLst>
               <p:ext uri="{D42A27DB-BD31-4B8C-83A1-F6EECF244321}">
-                <p14:modId xmlns:p14="http://schemas.microsoft.com/office/powerpoint/2010/main" val="2443060525"/>
+                <p14:modId xmlns:p14="http://schemas.microsoft.com/office/powerpoint/2010/main" val="3802999951"/>
               </p:ext>
             </p:extLst>
           </p:nvPr>
         </p:nvGraphicFramePr>
         <p:xfrm>
-          <a:off x="4193730" y="3251234"/>
+          <a:off x="4205089" y="3300145"/>
           <a:ext cx="1384916" cy="4572000"/>
         </p:xfrm>
         <a:graphic>
@@ -8339,7 +8114,7 @@
               <a:tabLst/>
             </a:pPr>
             <a:r>
-              <a:rPr kumimoji="0" lang="en-US" sz="2400" b="0" i="0" u="none" strike="noStrike" cap="none" spc="0" normalizeH="0" baseline="0" dirty="0" smtClean="0">
+              <a:rPr kumimoji="0" lang="en-US" sz="2400" b="0" i="0" u="none" strike="noStrike" cap="none" spc="0" normalizeH="0" baseline="0" dirty="0">
                 <a:ln>
                   <a:noFill/>
                 </a:ln>
@@ -8374,7 +8149,7 @@
               <a:tabLst/>
             </a:pPr>
             <a:r>
-              <a:rPr kumimoji="0" lang="en-US" sz="2400" b="0" i="0" u="none" strike="noStrike" cap="none" spc="0" normalizeH="0" baseline="0" dirty="0" smtClean="0">
+              <a:rPr kumimoji="0" lang="en-US" sz="2400" b="0" i="0" u="none" strike="noStrike" cap="none" spc="0" normalizeH="0" baseline="0" dirty="0">
                 <a:ln>
                   <a:noFill/>
                 </a:ln>
@@ -8390,20 +8165,6 @@
               </a:rPr>
               <a:t>v</a:t>
             </a:r>
-            <a:endParaRPr kumimoji="0" lang="en-US" sz="2400" b="0" i="0" u="none" strike="noStrike" cap="none" spc="0" normalizeH="0" baseline="0" dirty="0">
-              <a:ln>
-                <a:noFill/>
-              </a:ln>
-              <a:solidFill>
-                <a:schemeClr val="tx1"/>
-              </a:solidFill>
-              <a:effectLst/>
-              <a:uFillTx/>
-              <a:latin typeface="+mn-lt"/>
-              <a:ea typeface="+mn-ea"/>
-              <a:cs typeface="+mn-cs"/>
-              <a:sym typeface="Helvetica Light"/>
-            </a:endParaRPr>
           </a:p>
         </p:txBody>
       </p:sp>
@@ -8472,7 +8233,7 @@
               <a:tabLst/>
             </a:pPr>
             <a:r>
-              <a:rPr lang="en-US" sz="2400" dirty="0" smtClean="0">
+              <a:rPr lang="en-US" sz="2400" dirty="0">
                 <a:solidFill>
                   <a:schemeClr val="tx1"/>
                 </a:solidFill>
@@ -8480,7 +8241,7 @@
               <a:t>“</a:t>
             </a:r>
             <a:r>
-              <a:rPr lang="en-US" sz="2400" dirty="0" err="1" smtClean="0">
+              <a:rPr lang="en-US" sz="2400" dirty="0" err="1">
                 <a:solidFill>
                   <a:schemeClr val="tx1"/>
                 </a:solidFill>
@@ -8595,8 +8356,8 @@
         </p:nvSpPr>
         <p:spPr>
           <a:xfrm>
-            <a:off x="475247" y="501064"/>
-            <a:ext cx="12422606" cy="2318583"/>
+            <a:off x="0" y="501064"/>
+            <a:ext cx="12897853" cy="2318583"/>
           </a:xfrm>
           <a:prstGeom prst="rect">
             <a:avLst/>
@@ -8644,7 +8405,7 @@
               <a:tabLst/>
             </a:pPr>
             <a:r>
-              <a:rPr kumimoji="0" lang="en-US" sz="3600" b="0" i="1" u="none" strike="noStrike" cap="none" spc="0" normalizeH="0" baseline="0" dirty="0" err="1" smtClean="0">
+              <a:rPr kumimoji="0" lang="en-US" sz="3600" b="0" i="1" u="none" strike="noStrike" cap="none" spc="0" normalizeH="0" baseline="0" dirty="0" err="1">
                 <a:ln>
                   <a:noFill/>
                 </a:ln>
@@ -8661,7 +8422,7 @@
               <a:t>hashCode</a:t>
             </a:r>
             <a:r>
-              <a:rPr kumimoji="0" lang="en-US" sz="3600" b="0" i="1" u="none" strike="noStrike" cap="none" spc="0" normalizeH="0" baseline="0" dirty="0" smtClean="0">
+              <a:rPr kumimoji="0" lang="en-US" sz="3600" b="0" i="1" u="none" strike="noStrike" cap="none" spc="0" normalizeH="0" baseline="0" dirty="0">
                 <a:ln>
                   <a:noFill/>
                 </a:ln>
@@ -8678,7 +8439,7 @@
               <a:t>() </a:t>
             </a:r>
             <a:r>
-              <a:rPr kumimoji="0" lang="en-US" sz="3600" b="0" i="0" u="none" strike="noStrike" cap="none" spc="0" normalizeH="0" baseline="0" dirty="0" smtClean="0">
+              <a:rPr kumimoji="0" lang="en-US" sz="3600" b="0" i="0" u="none" strike="noStrike" cap="none" spc="0" normalizeH="0" baseline="0" dirty="0">
                 <a:ln>
                   <a:noFill/>
                 </a:ln>
@@ -8695,7 +8456,7 @@
               <a:t>computed</a:t>
             </a:r>
             <a:r>
-              <a:rPr kumimoji="0" lang="en-US" sz="3600" b="0" i="0" u="none" strike="noStrike" cap="none" spc="0" normalizeH="0" dirty="0" smtClean="0">
+              <a:rPr kumimoji="0" lang="en-US" sz="3600" b="0" i="0" u="none" strike="noStrike" cap="none" spc="0" normalizeH="0" dirty="0">
                 <a:ln>
                   <a:noFill/>
                 </a:ln>
@@ -8730,34 +8491,34 @@
               <a:tabLst/>
             </a:pPr>
             <a:r>
-              <a:rPr lang="en-US" dirty="0" smtClean="0"/>
+              <a:rPr lang="en-US" dirty="0"/>
               <a:t>In this example, assuming </a:t>
             </a:r>
             <a:r>
-              <a:rPr lang="en-US" i="1" dirty="0" smtClean="0"/>
+              <a:rPr lang="en-US" i="1" dirty="0"/>
               <a:t>“foo”.</a:t>
             </a:r>
             <a:r>
-              <a:rPr lang="en-US" i="1" dirty="0" err="1" smtClean="0"/>
+              <a:rPr lang="en-US" i="1" dirty="0" err="1"/>
               <a:t>hashCode</a:t>
             </a:r>
             <a:r>
-              <a:rPr lang="en-US" i="1" dirty="0" smtClean="0"/>
+              <a:rPr lang="en-US" i="1" dirty="0"/>
               <a:t>()==“bar”.</a:t>
             </a:r>
             <a:r>
-              <a:rPr lang="en-US" i="1" dirty="0" err="1" smtClean="0"/>
+              <a:rPr lang="en-US" i="1" dirty="0" err="1"/>
               <a:t>hashCode</a:t>
             </a:r>
             <a:r>
-              <a:rPr lang="en-US" i="1" dirty="0" smtClean="0"/>
+              <a:rPr lang="en-US" i="1" dirty="0"/>
               <a:t>()</a:t>
             </a:r>
             <a:r>
-              <a:rPr lang="en-US" dirty="0" smtClean="0"/>
+              <a:rPr lang="en-US" dirty="0"/>
               <a:t>, because same bucket.</a:t>
             </a:r>
-            <a:endParaRPr lang="en-US" i="1" dirty="0" smtClean="0"/>
+            <a:endParaRPr lang="en-US" i="1" dirty="0"/>
           </a:p>
           <a:p>
             <a:pPr marL="0" marR="0" indent="0" algn="l" defTabSz="584200" rtl="0" fontAlgn="auto" latinLnBrk="0" hangingPunct="0">
@@ -8777,23 +8538,23 @@
               <a:tabLst/>
             </a:pPr>
             <a:r>
-              <a:rPr lang="en-US" dirty="0" smtClean="0"/>
+              <a:rPr lang="en-US" dirty="0"/>
               <a:t>However, </a:t>
             </a:r>
             <a:r>
-              <a:rPr lang="en-US" i="1" dirty="0" smtClean="0"/>
+              <a:rPr lang="en-US" i="1" dirty="0"/>
               <a:t>“</a:t>
             </a:r>
             <a:r>
-              <a:rPr lang="en-US" i="1" dirty="0" err="1" smtClean="0"/>
+              <a:rPr lang="en-US" i="1" dirty="0" err="1"/>
               <a:t>foo”.equals</a:t>
             </a:r>
             <a:r>
-              <a:rPr lang="en-US" i="1" dirty="0" smtClean="0"/>
+              <a:rPr lang="en-US" i="1" dirty="0"/>
               <a:t>(“bar”) </a:t>
             </a:r>
             <a:r>
-              <a:rPr lang="en-US" dirty="0" smtClean="0"/>
+              <a:rPr lang="en-US" dirty="0"/>
               <a:t>is false</a:t>
             </a:r>
             <a:endParaRPr kumimoji="0" lang="en-US" sz="3600" b="0" u="none" strike="noStrike" cap="none" spc="0" normalizeH="0" baseline="0" dirty="0">
@@ -8901,8 +8662,8 @@
         </p:nvSpPr>
         <p:spPr>
           <a:xfrm>
-            <a:off x="6526310" y="6517135"/>
-            <a:ext cx="5993732" cy="2872581"/>
+            <a:off x="6055360" y="6517135"/>
+            <a:ext cx="6464682" cy="2872581"/>
           </a:xfrm>
           <a:prstGeom prst="rect">
             <a:avLst/>
@@ -8950,35 +8711,35 @@
               <a:tabLst/>
             </a:pPr>
             <a:r>
-              <a:rPr lang="en-US" dirty="0" smtClean="0"/>
+              <a:rPr lang="en-US" dirty="0"/>
               <a:t>Once the bucket is determined with </a:t>
             </a:r>
             <a:r>
-              <a:rPr lang="en-US" i="1" dirty="0" err="1" smtClean="0"/>
+              <a:rPr lang="en-US" i="1" dirty="0" err="1"/>
               <a:t>hashCode</a:t>
             </a:r>
             <a:r>
-              <a:rPr lang="en-US" i="1" dirty="0" smtClean="0"/>
+              <a:rPr lang="en-US" i="1" dirty="0"/>
               <a:t>()</a:t>
             </a:r>
             <a:r>
-              <a:rPr lang="en-US" dirty="0" smtClean="0"/>
+              <a:rPr lang="en-US" dirty="0"/>
               <a:t>, we use </a:t>
             </a:r>
             <a:r>
-              <a:rPr lang="en-US" i="1" dirty="0" smtClean="0"/>
+              <a:rPr lang="en-US" i="1" dirty="0"/>
               <a:t>equals() </a:t>
             </a:r>
             <a:r>
-              <a:rPr lang="en-US" dirty="0" smtClean="0"/>
+              <a:rPr lang="en-US" dirty="0"/>
               <a:t>on the </a:t>
             </a:r>
             <a:r>
-              <a:rPr lang="en-US" i="1" dirty="0" smtClean="0"/>
+              <a:rPr lang="en-US" i="1" dirty="0"/>
               <a:t>keys</a:t>
             </a:r>
             <a:r>
-              <a:rPr lang="en-US" dirty="0" smtClean="0"/>
+              <a:rPr lang="en-US" dirty="0"/>
               <a:t> in the list (one at a time), to see if there is a match </a:t>
             </a:r>
             <a:endParaRPr kumimoji="0" lang="en-US" sz="3600" b="0" u="none" strike="noStrike" cap="none" spc="0" normalizeH="0" baseline="0" dirty="0">

</xml_diff>

<commit_message>
Small update wrt Lecture 05.
</commit_message>
<xml_diff>
--- a/docs/slides/06/06_hash_maps.pptx
+++ b/docs/slides/06/06_hash_maps.pptx
@@ -2191,7 +2191,7 @@
           </a:ln>
           <a:extLst>
             <a:ext uri="{C572A759-6A51-4108-AA02-DFA0A04FC94B}">
-              <ma14:wrappingTextBoxFlag xmlns="" xmlns:ma14="http://schemas.microsoft.com/office/mac/drawingml/2011/main" val="1"/>
+              <ma14:wrappingTextBoxFlag xmlns:ma14="http://schemas.microsoft.com/office/mac/drawingml/2011/main" xmlns="" val="1"/>
             </a:ext>
           </a:extLst>
         </p:spPr>
@@ -2230,7 +2230,7 @@
           </a:ln>
           <a:extLst>
             <a:ext uri="{C572A759-6A51-4108-AA02-DFA0A04FC94B}">
-              <ma14:wrappingTextBoxFlag xmlns="" xmlns:ma14="http://schemas.microsoft.com/office/mac/drawingml/2011/main" val="1"/>
+              <ma14:wrappingTextBoxFlag xmlns:ma14="http://schemas.microsoft.com/office/mac/drawingml/2011/main" xmlns="" val="1"/>
             </a:ext>
           </a:extLst>
         </p:spPr>
@@ -3207,13 +3207,14 @@
           <a:p>
             <a:pPr algn="r"/>
             <a:r>
-              <a:rPr lang="en-US"/>
-              <a:t>Prof. </a:t>
-            </a:r>
-            <a:r>
-              <a:rPr lang="en-US" dirty="0"/>
-              <a:t>Andrea Arcuri</a:t>
-            </a:r>
+              <a:rPr lang="en-US" dirty="0"/>
+              <a:t>Bogdan </a:t>
+            </a:r>
+            <a:r>
+              <a:rPr lang="en-US" dirty="0" err="1"/>
+              <a:t>Marculescu</a:t>
+            </a:r>
+            <a:endParaRPr lang="en-US" dirty="0"/>
           </a:p>
         </p:txBody>
       </p:sp>
@@ -5385,8 +5386,8 @@
           </a:p>
         </p:txBody>
       </p:sp>
-      <mc:AlternateContent xmlns:mc="http://schemas.openxmlformats.org/markup-compatibility/2006">
-        <mc:Choice xmlns:a14="http://schemas.microsoft.com/office/drawing/2010/main" Requires="a14">
+      <mc:AlternateContent xmlns:mc="http://schemas.openxmlformats.org/markup-compatibility/2006" xmlns:a14="http://schemas.microsoft.com/office/drawing/2010/main">
+        <mc:Choice Requires="a14">
           <p:sp>
             <p:nvSpPr>
               <p:cNvPr id="3" name="Text Placeholder 2">
@@ -5494,7 +5495,7 @@
             </p:txBody>
           </p:sp>
         </mc:Choice>
-        <mc:Fallback>
+        <mc:Fallback xmlns="">
           <p:sp>
             <p:nvSpPr>
               <p:cNvPr id="3" name="Text Placeholder 2">
@@ -16716,8 +16717,8 @@
           </a:p>
         </p:txBody>
       </p:sp>
-      <mc:AlternateContent xmlns:mc="http://schemas.openxmlformats.org/markup-compatibility/2006">
-        <mc:Choice xmlns:a14="http://schemas.microsoft.com/office/drawing/2010/main" Requires="a14">
+      <mc:AlternateContent xmlns:mc="http://schemas.openxmlformats.org/markup-compatibility/2006" xmlns:a14="http://schemas.microsoft.com/office/drawing/2010/main">
+        <mc:Choice Requires="a14">
           <p:sp>
             <p:nvSpPr>
               <p:cNvPr id="3" name="Text Placeholder 2">
@@ -17004,7 +17005,7 @@
             </p:txBody>
           </p:sp>
         </mc:Choice>
-        <mc:Fallback>
+        <mc:Fallback xmlns="">
           <p:sp>
             <p:nvSpPr>
               <p:cNvPr id="3" name="Text Placeholder 2">

</xml_diff>